<commit_message>
Updated presentation and tutorial.
</commit_message>
<xml_diff>
--- a/Data Extraction Presentation.pptx
+++ b/Data Extraction Presentation.pptx
@@ -335,7 +335,7 @@
           <a:p>
             <a:fld id="{B96FE965-9E90-466A-8279-5E75DB5B97E7}" type="datetimeFigureOut">
               <a:rPr lang="en-US" smtClean="0"/>
-              <a:t>8/5/2020</a:t>
+              <a:t>8/6/2020</a:t>
             </a:fld>
             <a:endParaRPr lang="en-US"/>
           </a:p>
@@ -533,7 +533,7 @@
           <a:p>
             <a:fld id="{B96FE965-9E90-466A-8279-5E75DB5B97E7}" type="datetimeFigureOut">
               <a:rPr lang="en-US" smtClean="0"/>
-              <a:t>8/5/2020</a:t>
+              <a:t>8/6/2020</a:t>
             </a:fld>
             <a:endParaRPr lang="en-US"/>
           </a:p>
@@ -741,7 +741,7 @@
           <a:p>
             <a:fld id="{B96FE965-9E90-466A-8279-5E75DB5B97E7}" type="datetimeFigureOut">
               <a:rPr lang="en-US" smtClean="0"/>
-              <a:t>8/5/2020</a:t>
+              <a:t>8/6/2020</a:t>
             </a:fld>
             <a:endParaRPr lang="en-US"/>
           </a:p>
@@ -939,7 +939,7 @@
           <a:p>
             <a:fld id="{B96FE965-9E90-466A-8279-5E75DB5B97E7}" type="datetimeFigureOut">
               <a:rPr lang="en-US" smtClean="0"/>
-              <a:t>8/5/2020</a:t>
+              <a:t>8/6/2020</a:t>
             </a:fld>
             <a:endParaRPr lang="en-US"/>
           </a:p>
@@ -1214,7 +1214,7 @@
           <a:p>
             <a:fld id="{B96FE965-9E90-466A-8279-5E75DB5B97E7}" type="datetimeFigureOut">
               <a:rPr lang="en-US" smtClean="0"/>
-              <a:t>8/5/2020</a:t>
+              <a:t>8/6/2020</a:t>
             </a:fld>
             <a:endParaRPr lang="en-US"/>
           </a:p>
@@ -1479,7 +1479,7 @@
           <a:p>
             <a:fld id="{B96FE965-9E90-466A-8279-5E75DB5B97E7}" type="datetimeFigureOut">
               <a:rPr lang="en-US" smtClean="0"/>
-              <a:t>8/5/2020</a:t>
+              <a:t>8/6/2020</a:t>
             </a:fld>
             <a:endParaRPr lang="en-US"/>
           </a:p>
@@ -1891,7 +1891,7 @@
           <a:p>
             <a:fld id="{B96FE965-9E90-466A-8279-5E75DB5B97E7}" type="datetimeFigureOut">
               <a:rPr lang="en-US" smtClean="0"/>
-              <a:t>8/5/2020</a:t>
+              <a:t>8/6/2020</a:t>
             </a:fld>
             <a:endParaRPr lang="en-US"/>
           </a:p>
@@ -2032,7 +2032,7 @@
           <a:p>
             <a:fld id="{B96FE965-9E90-466A-8279-5E75DB5B97E7}" type="datetimeFigureOut">
               <a:rPr lang="en-US" smtClean="0"/>
-              <a:t>8/5/2020</a:t>
+              <a:t>8/6/2020</a:t>
             </a:fld>
             <a:endParaRPr lang="en-US"/>
           </a:p>
@@ -2145,7 +2145,7 @@
           <a:p>
             <a:fld id="{B96FE965-9E90-466A-8279-5E75DB5B97E7}" type="datetimeFigureOut">
               <a:rPr lang="en-US" smtClean="0"/>
-              <a:t>8/5/2020</a:t>
+              <a:t>8/6/2020</a:t>
             </a:fld>
             <a:endParaRPr lang="en-US"/>
           </a:p>
@@ -2456,7 +2456,7 @@
           <a:p>
             <a:fld id="{B96FE965-9E90-466A-8279-5E75DB5B97E7}" type="datetimeFigureOut">
               <a:rPr lang="en-US" smtClean="0"/>
-              <a:t>8/5/2020</a:t>
+              <a:t>8/6/2020</a:t>
             </a:fld>
             <a:endParaRPr lang="en-US"/>
           </a:p>
@@ -2744,7 +2744,7 @@
           <a:p>
             <a:fld id="{B96FE965-9E90-466A-8279-5E75DB5B97E7}" type="datetimeFigureOut">
               <a:rPr lang="en-US" smtClean="0"/>
-              <a:t>8/5/2020</a:t>
+              <a:t>8/6/2020</a:t>
             </a:fld>
             <a:endParaRPr lang="en-US"/>
           </a:p>
@@ -2985,7 +2985,7 @@
           <a:p>
             <a:fld id="{B96FE965-9E90-466A-8279-5E75DB5B97E7}" type="datetimeFigureOut">
               <a:rPr lang="en-US" smtClean="0"/>
-              <a:t>8/5/2020</a:t>
+              <a:t>8/6/2020</a:t>
             </a:fld>
             <a:endParaRPr lang="en-US"/>
           </a:p>
@@ -3917,6 +3917,22 @@
             </a:r>
             <a:endParaRPr lang="en-US" dirty="0"/>
           </a:p>
+          <a:p>
+            <a:r>
+              <a:rPr lang="en-US" dirty="0"/>
+              <a:t>Questions? </a:t>
+            </a:r>
+            <a:r>
+              <a:rPr lang="en-US" dirty="0">
+                <a:hlinkClick r:id="rId4"/>
+              </a:rPr>
+              <a:t>ben@leadensky.com</a:t>
+            </a:r>
+            <a:endParaRPr lang="en-US" dirty="0"/>
+          </a:p>
+          <a:p>
+            <a:endParaRPr lang="en-US" dirty="0"/>
+          </a:p>
         </p:txBody>
       </p:sp>
     </p:spTree>

</xml_diff>